<commit_message>
JR: Added Selenium IDE Hands On PPT
</commit_message>
<xml_diff>
--- a/ppt/01 Selenium Intro.pptx
+++ b/ppt/01 Selenium Intro.pptx
@@ -199,7 +199,7 @@
             <a:fld id="{0BCC1A13-9BC6-E748-85B2-FB4C4F4BC29F}" type="datetimeFigureOut">
               <a:rPr lang="en-US" smtClean="0"/>
               <a:pPr/>
-              <a:t>14/05/13</a:t>
+              <a:t>16/05/13</a:t>
             </a:fld>
             <a:endParaRPr lang="en-US"/>
           </a:p>
@@ -366,7 +366,7 @@
             <a:fld id="{DA530D03-8AB9-49BC-87A7-70C393F77500}" type="datetimeFigureOut">
               <a:rPr lang="en-US" smtClean="0"/>
               <a:pPr/>
-              <a:t>14/05/13</a:t>
+              <a:t>16/05/13</a:t>
             </a:fld>
             <a:endParaRPr lang="en-US"/>
           </a:p>
@@ -3508,7 +3508,7 @@
                 <a:latin typeface="Marydale"/>
                 <a:cs typeface="Marydale"/>
               </a:rPr>
-              <a:t>Introduction to Selenium</a:t>
+              <a:t>Overview of Selenium</a:t>
             </a:r>
           </a:p>
         </p:txBody>
@@ -3521,8 +3521,8 @@
         </p:nvSpPr>
         <p:spPr>
           <a:xfrm>
-            <a:off x="1251990" y="2257622"/>
-            <a:ext cx="6993259" cy="3108544"/>
+            <a:off x="1251990" y="1649430"/>
+            <a:ext cx="6993259" cy="3970318"/>
           </a:xfrm>
           <a:prstGeom prst="rect">
             <a:avLst/>
@@ -3568,6 +3568,29 @@
                 <a:cs typeface="Marydale"/>
               </a:rPr>
               <a:t>Record &amp; Playback with Selenium IDE</a:t>
+            </a:r>
+          </a:p>
+          <a:p>
+            <a:pPr marL="457200" indent="-457200">
+              <a:buFont typeface="+mj-lt"/>
+              <a:buAutoNum type="arabicPeriod"/>
+            </a:pPr>
+            <a:endParaRPr lang="en-US" sz="2800">
+              <a:latin typeface="+mj-lt"/>
+              <a:cs typeface="Marydale"/>
+            </a:endParaRPr>
+          </a:p>
+          <a:p>
+            <a:pPr marL="457200" indent="-457200">
+              <a:buFont typeface="+mj-lt"/>
+              <a:buAutoNum type="arabicPeriod"/>
+            </a:pPr>
+            <a:r>
+              <a:rPr lang="en-US" sz="2800">
+                <a:latin typeface="+mj-lt"/>
+                <a:cs typeface="Marydale"/>
+              </a:rPr>
+              <a:t>Regression Tests with Selenium RC</a:t>
             </a:r>
           </a:p>
           <a:p>
@@ -4152,7 +4175,7 @@
         <p:spPr>
           <a:xfrm>
             <a:off x="286166" y="1363206"/>
-            <a:ext cx="8714746" cy="6586417"/>
+            <a:ext cx="8714746" cy="6063198"/>
           </a:xfrm>
           <a:prstGeom prst="rect">
             <a:avLst/>
@@ -4209,7 +4232,7 @@
                 <a:latin typeface="+mj-lt"/>
                 <a:cs typeface="MS Reference Sans Serif"/>
               </a:rPr>
-              <a:t>Selenium Remote Control</a:t>
+              <a:t>Selenium IDE</a:t>
             </a:r>
           </a:p>
           <a:p>
@@ -4225,23 +4248,7 @@
                 <a:latin typeface="+mj-lt"/>
                 <a:cs typeface="MS Reference Sans Serif"/>
               </a:rPr>
-              <a:t>Selenium Grid</a:t>
-            </a:r>
-          </a:p>
-          <a:p>
-            <a:pPr marL="914400" lvl="1" indent="-457200">
-              <a:spcBef>
-                <a:spcPts val="1200"/>
-              </a:spcBef>
-              <a:buFont typeface="Arial"/>
-              <a:buChar char="•"/>
-            </a:pPr>
-            <a:r>
-              <a:rPr lang="en-US" sz="2400">
-                <a:latin typeface="+mj-lt"/>
-                <a:cs typeface="MS Reference Sans Serif"/>
-              </a:rPr>
-              <a:t>Selenium IDE</a:t>
+              <a:t>Selenium Remote Control (&amp; Selenium Grid)</a:t>
             </a:r>
           </a:p>
           <a:p>

</xml_diff>